<commit_message>
Update Exploring Plain Vision Transformer Backbones for Object Detection_M11015039.pptx
</commit_message>
<xml_diff>
--- a/Exploring Plain Vision Transformer Backbones for Object Detection_M11015039.pptx
+++ b/Exploring Plain Vision Transformer Backbones for Object Detection_M11015039.pptx
@@ -6,7 +6,7 @@
     <p:sldMasterId id="2147483671" r:id="rId2"/>
   </p:sldMasterIdLst>
   <p:notesMasterIdLst>
-    <p:notesMasterId r:id="rId30"/>
+    <p:notesMasterId r:id="rId32"/>
   </p:notesMasterIdLst>
   <p:sldIdLst>
     <p:sldId id="256" r:id="rId3"/>
@@ -35,7 +35,9 @@
     <p:sldId id="318" r:id="rId26"/>
     <p:sldId id="321" r:id="rId27"/>
     <p:sldId id="322" r:id="rId28"/>
-    <p:sldId id="292" r:id="rId29"/>
+    <p:sldId id="324" r:id="rId29"/>
+    <p:sldId id="323" r:id="rId30"/>
+    <p:sldId id="292" r:id="rId31"/>
   </p:sldIdLst>
   <p:sldSz cx="9144000" cy="5143500" type="screen16x9"/>
   <p:notesSz cx="6858000" cy="9144000"/>
@@ -5297,6 +5299,104 @@
               <a:tabLst/>
               <a:defRPr/>
             </a:pPr>
+            <a:r>
+              <a:rPr lang="zh-TW" altLang="en-US" dirty="0"/>
+              <a:t>長尾分布 資料極度不平衡 </a:t>
+            </a:r>
+            <a:r>
+              <a:rPr lang="en-US" altLang="zh-TW" b="0" i="0" dirty="0">
+                <a:effectLst/>
+                <a:latin typeface="Arial" panose="020B0604020202020204" pitchFamily="34" charset="0"/>
+              </a:rPr>
+              <a:t>&lt;10</a:t>
+            </a:r>
+          </a:p>
+          <a:p>
+            <a:pPr marL="228600" marR="0" lvl="0" indent="-228600" algn="l" defTabSz="914400" rtl="0" eaLnBrk="1" fontAlgn="auto" latinLnBrk="0" hangingPunct="1">
+              <a:lnSpc>
+                <a:spcPct val="100000"/>
+              </a:lnSpc>
+              <a:spcBef>
+                <a:spcPts val="0"/>
+              </a:spcBef>
+              <a:spcAft>
+                <a:spcPts val="0"/>
+              </a:spcAft>
+              <a:buClr>
+                <a:schemeClr val="dk1"/>
+              </a:buClr>
+              <a:buSzPts val="1200"/>
+              <a:buFont typeface="Calibri"/>
+              <a:buAutoNum type="arabicPeriod"/>
+              <a:tabLst/>
+              <a:defRPr/>
+            </a:pPr>
+            <a:r>
+              <a:rPr lang="en-US" altLang="zh-TW" dirty="0" err="1"/>
+              <a:t>ViTDet</a:t>
+            </a:r>
+            <a:r>
+              <a:rPr lang="zh-TW" altLang="en-US" dirty="0"/>
+              <a:t>呈現了具有競爭力的性能</a:t>
+            </a:r>
+            <a:endParaRPr lang="en-US" altLang="zh-TW" dirty="0"/>
+          </a:p>
+          <a:p>
+            <a:pPr marL="228600" marR="0" lvl="0" indent="-228600" algn="l" defTabSz="914400" rtl="0" eaLnBrk="1" fontAlgn="auto" latinLnBrk="0" hangingPunct="1">
+              <a:lnSpc>
+                <a:spcPct val="100000"/>
+              </a:lnSpc>
+              <a:spcBef>
+                <a:spcPts val="0"/>
+              </a:spcBef>
+              <a:spcAft>
+                <a:spcPts val="0"/>
+              </a:spcAft>
+              <a:buClr>
+                <a:schemeClr val="dk1"/>
+              </a:buClr>
+              <a:buSzPts val="1200"/>
+              <a:buFont typeface="Calibri"/>
+              <a:buAutoNum type="arabicPeriod"/>
+              <a:tabLst/>
+              <a:defRPr/>
+            </a:pPr>
+            <a:r>
+              <a:rPr lang="en-US" altLang="zh-TW" dirty="0"/>
+              <a:t> 2021 competition winner‘s</a:t>
+            </a:r>
+            <a:r>
+              <a:rPr lang="zh-TW" altLang="en-US" dirty="0"/>
+              <a:t> 結合</a:t>
+            </a:r>
+            <a:r>
+              <a:rPr lang="en-US" altLang="zh-TW" dirty="0"/>
+              <a:t>HTC </a:t>
+            </a:r>
+            <a:r>
+              <a:rPr lang="zh-TW" altLang="en-US" dirty="0"/>
+              <a:t>和 </a:t>
+            </a:r>
+            <a:r>
+              <a:rPr lang="en-US" altLang="zh-TW" dirty="0"/>
+              <a:t>CBNetV2</a:t>
+            </a:r>
+            <a:r>
+              <a:rPr lang="zh-TW" altLang="en-US" dirty="0"/>
+              <a:t>，結合了兩個 </a:t>
+            </a:r>
+            <a:r>
+              <a:rPr lang="en-US" altLang="zh-TW" dirty="0" err="1"/>
+              <a:t>Swin</a:t>
+            </a:r>
+            <a:r>
+              <a:rPr lang="en-US" altLang="zh-TW" dirty="0"/>
+              <a:t>-L </a:t>
+            </a:r>
+            <a:r>
+              <a:rPr lang="zh-TW" altLang="en-US" dirty="0"/>
+              <a:t>主幹</a:t>
+            </a:r>
             <a:endParaRPr dirty="0"/>
           </a:p>
         </p:txBody>
@@ -5361,6 +5461,354 @@
 </file>
 
 <file path=ppt/notesSlides/notesSlide27.xml><?xml version="1.0" encoding="utf-8"?>
+<p:notes xmlns:a="http://schemas.openxmlformats.org/drawingml/2006/main" xmlns:r="http://schemas.openxmlformats.org/officeDocument/2006/relationships" xmlns:p="http://schemas.openxmlformats.org/presentationml/2006/main" showMasterSp="0" showMasterPhAnim="0">
+  <p:cSld>
+    <p:spTree>
+      <p:nvGrpSpPr>
+        <p:cNvPr id="1" name="Shape 171"/>
+        <p:cNvGrpSpPr/>
+        <p:nvPr/>
+      </p:nvGrpSpPr>
+      <p:grpSpPr>
+        <a:xfrm>
+          <a:off x="0" y="0"/>
+          <a:ext cx="0" cy="0"/>
+          <a:chOff x="0" y="0"/>
+          <a:chExt cx="0" cy="0"/>
+        </a:xfrm>
+      </p:grpSpPr>
+      <p:sp>
+        <p:nvSpPr>
+          <p:cNvPr id="172" name="Google Shape;172;g1144437607e_2_107:notes"/>
+          <p:cNvSpPr>
+            <a:spLocks noGrp="1" noRot="1" noChangeAspect="1"/>
+          </p:cNvSpPr>
+          <p:nvPr>
+            <p:ph type="sldImg" idx="2"/>
+          </p:nvPr>
+        </p:nvSpPr>
+        <p:spPr>
+          <a:xfrm>
+            <a:off x="685800" y="1143000"/>
+            <a:ext cx="5486400" cy="3086100"/>
+          </a:xfrm>
+          <a:custGeom>
+            <a:avLst/>
+            <a:gdLst/>
+            <a:ahLst/>
+            <a:cxnLst/>
+            <a:rect l="l" t="t" r="r" b="b"/>
+            <a:pathLst>
+              <a:path w="120000" h="120000" extrusionOk="0">
+                <a:moveTo>
+                  <a:pt x="0" y="0"/>
+                </a:moveTo>
+                <a:lnTo>
+                  <a:pt x="120000" y="0"/>
+                </a:lnTo>
+                <a:lnTo>
+                  <a:pt x="120000" y="120000"/>
+                </a:lnTo>
+                <a:lnTo>
+                  <a:pt x="0" y="120000"/>
+                </a:lnTo>
+                <a:close/>
+              </a:path>
+            </a:pathLst>
+          </a:custGeom>
+          <a:noFill/>
+          <a:ln w="12700" cap="flat" cmpd="sng">
+            <a:solidFill>
+              <a:srgbClr val="000000"/>
+            </a:solidFill>
+            <a:prstDash val="solid"/>
+            <a:round/>
+            <a:headEnd type="none" w="sm" len="sm"/>
+            <a:tailEnd type="none" w="sm" len="sm"/>
+          </a:ln>
+        </p:spPr>
+      </p:sp>
+      <p:sp>
+        <p:nvSpPr>
+          <p:cNvPr id="173" name="Google Shape;173;g1144437607e_2_107:notes"/>
+          <p:cNvSpPr txBox="1">
+            <a:spLocks noGrp="1"/>
+          </p:cNvSpPr>
+          <p:nvPr>
+            <p:ph type="body" idx="1"/>
+          </p:nvPr>
+        </p:nvSpPr>
+        <p:spPr>
+          <a:xfrm>
+            <a:off x="685800" y="4400550"/>
+            <a:ext cx="5486400" cy="3600600"/>
+          </a:xfrm>
+          <a:prstGeom prst="rect">
+            <a:avLst/>
+          </a:prstGeom>
+          <a:noFill/>
+          <a:ln>
+            <a:noFill/>
+          </a:ln>
+        </p:spPr>
+        <p:txBody>
+          <a:bodyPr spcFirstLastPara="1" wrap="square" lIns="91425" tIns="45700" rIns="91425" bIns="45700" anchor="t" anchorCtr="0">
+            <a:noAutofit/>
+          </a:bodyPr>
+          <a:lstStyle/>
+          <a:p>
+            <a:pPr marL="0" lvl="0" indent="0" algn="l" rtl="0">
+              <a:spcBef>
+                <a:spcPts val="0"/>
+              </a:spcBef>
+              <a:spcAft>
+                <a:spcPts val="0"/>
+              </a:spcAft>
+              <a:buNone/>
+            </a:pPr>
+            <a:endParaRPr/>
+          </a:p>
+        </p:txBody>
+      </p:sp>
+      <p:sp>
+        <p:nvSpPr>
+          <p:cNvPr id="174" name="Google Shape;174;g1144437607e_2_107:notes"/>
+          <p:cNvSpPr txBox="1">
+            <a:spLocks noGrp="1"/>
+          </p:cNvSpPr>
+          <p:nvPr>
+            <p:ph type="sldNum" idx="12"/>
+          </p:nvPr>
+        </p:nvSpPr>
+        <p:spPr>
+          <a:xfrm>
+            <a:off x="3884613" y="8685213"/>
+            <a:ext cx="2971800" cy="458700"/>
+          </a:xfrm>
+          <a:prstGeom prst="rect">
+            <a:avLst/>
+          </a:prstGeom>
+          <a:noFill/>
+          <a:ln>
+            <a:noFill/>
+          </a:ln>
+        </p:spPr>
+        <p:txBody>
+          <a:bodyPr spcFirstLastPara="1" wrap="square" lIns="91425" tIns="45700" rIns="91425" bIns="45700" anchor="b" anchorCtr="0">
+            <a:noAutofit/>
+          </a:bodyPr>
+          <a:lstStyle/>
+          <a:p>
+            <a:pPr marL="0" lvl="0" indent="0" algn="r" rtl="0">
+              <a:spcBef>
+                <a:spcPts val="0"/>
+              </a:spcBef>
+              <a:spcAft>
+                <a:spcPts val="0"/>
+              </a:spcAft>
+              <a:buNone/>
+            </a:pPr>
+            <a:fld id="{00000000-1234-1234-1234-123412341234}" type="slidenum">
+              <a:rPr lang="en-US" altLang="zh-TW"/>
+              <a:t>27</a:t>
+            </a:fld>
+            <a:endParaRPr/>
+          </a:p>
+        </p:txBody>
+      </p:sp>
+    </p:spTree>
+    <p:extLst>
+      <p:ext uri="{BB962C8B-B14F-4D97-AF65-F5344CB8AC3E}">
+        <p14:creationId xmlns:p14="http://schemas.microsoft.com/office/powerpoint/2010/main" val="2615168905"/>
+      </p:ext>
+    </p:extLst>
+  </p:cSld>
+  <p:clrMapOvr>
+    <a:masterClrMapping/>
+  </p:clrMapOvr>
+</p:notes>
+</file>
+
+<file path=ppt/notesSlides/notesSlide28.xml><?xml version="1.0" encoding="utf-8"?>
+<p:notes xmlns:a="http://schemas.openxmlformats.org/drawingml/2006/main" xmlns:r="http://schemas.openxmlformats.org/officeDocument/2006/relationships" xmlns:p="http://schemas.openxmlformats.org/presentationml/2006/main" showMasterSp="0" showMasterPhAnim="0">
+  <p:cSld>
+    <p:spTree>
+      <p:nvGrpSpPr>
+        <p:cNvPr id="1" name="Shape 159"/>
+        <p:cNvGrpSpPr/>
+        <p:nvPr/>
+      </p:nvGrpSpPr>
+      <p:grpSpPr>
+        <a:xfrm>
+          <a:off x="0" y="0"/>
+          <a:ext cx="0" cy="0"/>
+          <a:chOff x="0" y="0"/>
+          <a:chExt cx="0" cy="0"/>
+        </a:xfrm>
+      </p:grpSpPr>
+      <p:sp>
+        <p:nvSpPr>
+          <p:cNvPr id="160" name="Google Shape;160;g11584829504_1_93:notes"/>
+          <p:cNvSpPr>
+            <a:spLocks noGrp="1" noRot="1" noChangeAspect="1"/>
+          </p:cNvSpPr>
+          <p:nvPr>
+            <p:ph type="sldImg" idx="2"/>
+          </p:nvPr>
+        </p:nvSpPr>
+        <p:spPr>
+          <a:xfrm>
+            <a:off x="685800" y="1143000"/>
+            <a:ext cx="5486400" cy="3086100"/>
+          </a:xfrm>
+          <a:custGeom>
+            <a:avLst/>
+            <a:gdLst/>
+            <a:ahLst/>
+            <a:cxnLst/>
+            <a:rect l="l" t="t" r="r" b="b"/>
+            <a:pathLst>
+              <a:path w="120000" h="120000" extrusionOk="0">
+                <a:moveTo>
+                  <a:pt x="0" y="0"/>
+                </a:moveTo>
+                <a:lnTo>
+                  <a:pt x="120000" y="0"/>
+                </a:lnTo>
+                <a:lnTo>
+                  <a:pt x="120000" y="120000"/>
+                </a:lnTo>
+                <a:lnTo>
+                  <a:pt x="0" y="120000"/>
+                </a:lnTo>
+                <a:close/>
+              </a:path>
+            </a:pathLst>
+          </a:custGeom>
+          <a:noFill/>
+          <a:ln w="12700" cap="flat" cmpd="sng">
+            <a:solidFill>
+              <a:srgbClr val="000000"/>
+            </a:solidFill>
+            <a:prstDash val="solid"/>
+            <a:round/>
+            <a:headEnd type="none" w="sm" len="sm"/>
+            <a:tailEnd type="none" w="sm" len="sm"/>
+          </a:ln>
+        </p:spPr>
+      </p:sp>
+      <p:sp>
+        <p:nvSpPr>
+          <p:cNvPr id="161" name="Google Shape;161;g11584829504_1_93:notes"/>
+          <p:cNvSpPr txBox="1">
+            <a:spLocks noGrp="1"/>
+          </p:cNvSpPr>
+          <p:nvPr>
+            <p:ph type="body" idx="1"/>
+          </p:nvPr>
+        </p:nvSpPr>
+        <p:spPr>
+          <a:xfrm>
+            <a:off x="685800" y="4400550"/>
+            <a:ext cx="5486400" cy="3600600"/>
+          </a:xfrm>
+          <a:prstGeom prst="rect">
+            <a:avLst/>
+          </a:prstGeom>
+          <a:noFill/>
+          <a:ln>
+            <a:noFill/>
+          </a:ln>
+        </p:spPr>
+        <p:txBody>
+          <a:bodyPr spcFirstLastPara="1" wrap="square" lIns="91425" tIns="45700" rIns="91425" bIns="45700" anchor="t" anchorCtr="0">
+            <a:noAutofit/>
+          </a:bodyPr>
+          <a:lstStyle/>
+          <a:p>
+            <a:pPr marL="228600" marR="0" lvl="0" indent="-228600" algn="l" defTabSz="914400" rtl="0" eaLnBrk="1" fontAlgn="auto" latinLnBrk="0" hangingPunct="1">
+              <a:lnSpc>
+                <a:spcPct val="100000"/>
+              </a:lnSpc>
+              <a:spcBef>
+                <a:spcPts val="0"/>
+              </a:spcBef>
+              <a:spcAft>
+                <a:spcPts val="0"/>
+              </a:spcAft>
+              <a:buClr>
+                <a:schemeClr val="dk1"/>
+              </a:buClr>
+              <a:buSzPts val="1200"/>
+              <a:buFont typeface="Calibri"/>
+              <a:buAutoNum type="arabicPeriod"/>
+              <a:tabLst/>
+              <a:defRPr/>
+            </a:pPr>
+            <a:endParaRPr dirty="0"/>
+          </a:p>
+        </p:txBody>
+      </p:sp>
+      <p:sp>
+        <p:nvSpPr>
+          <p:cNvPr id="162" name="Google Shape;162;g11584829504_1_93:notes"/>
+          <p:cNvSpPr txBox="1">
+            <a:spLocks noGrp="1"/>
+          </p:cNvSpPr>
+          <p:nvPr>
+            <p:ph type="sldNum" idx="12"/>
+          </p:nvPr>
+        </p:nvSpPr>
+        <p:spPr>
+          <a:xfrm>
+            <a:off x="3884613" y="8685213"/>
+            <a:ext cx="2971800" cy="458700"/>
+          </a:xfrm>
+          <a:prstGeom prst="rect">
+            <a:avLst/>
+          </a:prstGeom>
+          <a:noFill/>
+          <a:ln>
+            <a:noFill/>
+          </a:ln>
+        </p:spPr>
+        <p:txBody>
+          <a:bodyPr spcFirstLastPara="1" wrap="square" lIns="91425" tIns="45700" rIns="91425" bIns="45700" anchor="b" anchorCtr="0">
+            <a:noAutofit/>
+          </a:bodyPr>
+          <a:lstStyle/>
+          <a:p>
+            <a:pPr marL="0" lvl="0" indent="0" algn="r" rtl="0">
+              <a:spcBef>
+                <a:spcPts val="0"/>
+              </a:spcBef>
+              <a:spcAft>
+                <a:spcPts val="0"/>
+              </a:spcAft>
+              <a:buNone/>
+            </a:pPr>
+            <a:fld id="{00000000-1234-1234-1234-123412341234}" type="slidenum">
+              <a:rPr lang="en-US" altLang="zh-TW"/>
+              <a:t>28</a:t>
+            </a:fld>
+            <a:endParaRPr/>
+          </a:p>
+        </p:txBody>
+      </p:sp>
+    </p:spTree>
+    <p:extLst>
+      <p:ext uri="{BB962C8B-B14F-4D97-AF65-F5344CB8AC3E}">
+        <p14:creationId xmlns:p14="http://schemas.microsoft.com/office/powerpoint/2010/main" val="1791656848"/>
+      </p:ext>
+    </p:extLst>
+  </p:cSld>
+  <p:clrMapOvr>
+    <a:masterClrMapping/>
+  </p:clrMapOvr>
+</p:notes>
+</file>
+
+<file path=ppt/notesSlides/notesSlide29.xml><?xml version="1.0" encoding="utf-8"?>
 <p:notes xmlns:a="http://schemas.openxmlformats.org/drawingml/2006/main" xmlns:r="http://schemas.openxmlformats.org/officeDocument/2006/relationships" xmlns:p="http://schemas.openxmlformats.org/presentationml/2006/main" showMasterSp="0" showMasterPhAnim="0">
   <p:cSld>
     <p:spTree>
@@ -30133,6 +30581,752 @@
           </a:p>
         </p:txBody>
       </p:sp>
+      <p:pic>
+        <p:nvPicPr>
+          <p:cNvPr id="4" name="圖片 3">
+            <a:extLst>
+              <a:ext uri="{FF2B5EF4-FFF2-40B4-BE49-F238E27FC236}">
+                <a16:creationId xmlns:a16="http://schemas.microsoft.com/office/drawing/2014/main" id="{0F9E0E34-6B79-40AA-B7C8-A720231D3796}"/>
+              </a:ext>
+            </a:extLst>
+          </p:cNvPr>
+          <p:cNvPicPr>
+            <a:picLocks noChangeAspect="1"/>
+          </p:cNvPicPr>
+          <p:nvPr/>
+        </p:nvPicPr>
+        <p:blipFill>
+          <a:blip r:embed="rId3"/>
+          <a:stretch>
+            <a:fillRect/>
+          </a:stretch>
+        </p:blipFill>
+        <p:spPr>
+          <a:xfrm>
+            <a:off x="0" y="1955793"/>
+            <a:ext cx="6237515" cy="2021923"/>
+          </a:xfrm>
+          <a:prstGeom prst="rect">
+            <a:avLst/>
+          </a:prstGeom>
+        </p:spPr>
+      </p:pic>
+      <p:sp>
+        <p:nvSpPr>
+          <p:cNvPr id="10" name="文字方塊 9">
+            <a:extLst>
+              <a:ext uri="{FF2B5EF4-FFF2-40B4-BE49-F238E27FC236}">
+                <a16:creationId xmlns:a16="http://schemas.microsoft.com/office/drawing/2014/main" id="{0359777F-B60E-4252-97FA-45F38318D71D}"/>
+              </a:ext>
+            </a:extLst>
+          </p:cNvPr>
+          <p:cNvSpPr txBox="1"/>
+          <p:nvPr/>
+        </p:nvSpPr>
+        <p:spPr>
+          <a:xfrm>
+            <a:off x="6368143" y="1419081"/>
+            <a:ext cx="2645228" cy="738664"/>
+          </a:xfrm>
+          <a:prstGeom prst="rect">
+            <a:avLst/>
+          </a:prstGeom>
+          <a:noFill/>
+        </p:spPr>
+        <p:txBody>
+          <a:bodyPr wrap="square">
+            <a:spAutoFit/>
+          </a:bodyPr>
+          <a:lstStyle/>
+          <a:p>
+            <a:r>
+              <a:rPr lang="en-US" altLang="zh-TW" b="0" i="0" dirty="0">
+                <a:effectLst/>
+                <a:latin typeface="Arial" panose="020B0604020202020204" pitchFamily="34" charset="0"/>
+              </a:rPr>
+              <a:t>Comparisons on</a:t>
+            </a:r>
+            <a:r>
+              <a:rPr lang="zh-TW" altLang="en-US" b="0" i="0" dirty="0">
+                <a:effectLst/>
+                <a:latin typeface="Arial" panose="020B0604020202020204" pitchFamily="34" charset="0"/>
+              </a:rPr>
+              <a:t> </a:t>
+            </a:r>
+            <a:r>
+              <a:rPr lang="en-US" altLang="zh-TW" b="0" i="0" dirty="0">
+                <a:effectLst/>
+                <a:latin typeface="Arial" panose="020B0604020202020204" pitchFamily="34" charset="0"/>
+              </a:rPr>
+              <a:t>LVIS</a:t>
+            </a:r>
+          </a:p>
+          <a:p>
+            <a:pPr marL="342900" indent="-342900">
+              <a:buAutoNum type="arabicPeriod"/>
+            </a:pPr>
+            <a:r>
+              <a:rPr lang="en-US" altLang="zh-TW" b="0" i="0" dirty="0">
+                <a:effectLst/>
+                <a:latin typeface="Arial" panose="020B0604020202020204" pitchFamily="34" charset="0"/>
+              </a:rPr>
+              <a:t>federated loss</a:t>
+            </a:r>
+          </a:p>
+          <a:p>
+            <a:pPr marL="342900" indent="-342900">
+              <a:buAutoNum type="arabicPeriod"/>
+            </a:pPr>
+            <a:r>
+              <a:rPr lang="en-US" altLang="zh-TW" dirty="0"/>
+              <a:t>repeat factor sampling</a:t>
+            </a:r>
+            <a:endParaRPr lang="zh-TW" altLang="en-US" dirty="0"/>
+          </a:p>
+        </p:txBody>
+      </p:sp>
+      <p:sp>
+        <p:nvSpPr>
+          <p:cNvPr id="11" name="文字方塊 10">
+            <a:extLst>
+              <a:ext uri="{FF2B5EF4-FFF2-40B4-BE49-F238E27FC236}">
+                <a16:creationId xmlns:a16="http://schemas.microsoft.com/office/drawing/2014/main" id="{7E108398-355F-413C-A383-D0B8A334695E}"/>
+              </a:ext>
+            </a:extLst>
+          </p:cNvPr>
+          <p:cNvSpPr txBox="1"/>
+          <p:nvPr/>
+        </p:nvSpPr>
+        <p:spPr>
+          <a:xfrm>
+            <a:off x="6368143" y="680417"/>
+            <a:ext cx="2645228" cy="738664"/>
+          </a:xfrm>
+          <a:prstGeom prst="rect">
+            <a:avLst/>
+          </a:prstGeom>
+          <a:noFill/>
+        </p:spPr>
+        <p:txBody>
+          <a:bodyPr wrap="square">
+            <a:spAutoFit/>
+          </a:bodyPr>
+          <a:lstStyle/>
+          <a:p>
+            <a:r>
+              <a:rPr lang="en-US" altLang="zh-TW" b="0" i="0" dirty="0">
+                <a:effectLst/>
+                <a:latin typeface="Arial" panose="020B0604020202020204" pitchFamily="34" charset="0"/>
+              </a:rPr>
+              <a:t>LVIS</a:t>
+            </a:r>
+          </a:p>
+          <a:p>
+            <a:r>
+              <a:rPr lang="en-US" altLang="zh-TW" b="0" i="0" dirty="0">
+                <a:effectLst/>
+                <a:latin typeface="Arial" panose="020B0604020202020204" pitchFamily="34" charset="0"/>
+              </a:rPr>
+              <a:t>1.1203 classes</a:t>
+            </a:r>
+          </a:p>
+          <a:p>
+            <a:r>
+              <a:rPr lang="en-US" altLang="zh-TW" dirty="0"/>
+              <a:t>2.</a:t>
+            </a:r>
+            <a:r>
+              <a:rPr lang="en-US" altLang="zh-TW" b="0" i="0" dirty="0">
+                <a:effectLst/>
+                <a:latin typeface="Arial" panose="020B0604020202020204" pitchFamily="34" charset="0"/>
+              </a:rPr>
+              <a:t> long-tailed object distribution</a:t>
+            </a:r>
+            <a:endParaRPr lang="zh-TW" altLang="en-US" dirty="0"/>
+          </a:p>
+        </p:txBody>
+      </p:sp>
+      <p:cxnSp>
+        <p:nvCxnSpPr>
+          <p:cNvPr id="5" name="直線單箭頭接點 4">
+            <a:extLst>
+              <a:ext uri="{FF2B5EF4-FFF2-40B4-BE49-F238E27FC236}">
+                <a16:creationId xmlns:a16="http://schemas.microsoft.com/office/drawing/2014/main" id="{CB6325FE-E9AA-4B0F-8151-2E942D41211D}"/>
+              </a:ext>
+            </a:extLst>
+          </p:cNvPr>
+          <p:cNvCxnSpPr/>
+          <p:nvPr/>
+        </p:nvCxnSpPr>
+        <p:spPr>
+          <a:xfrm>
+            <a:off x="5437414" y="2966754"/>
+            <a:ext cx="1224643" cy="0"/>
+          </a:xfrm>
+          <a:prstGeom prst="straightConnector1">
+            <a:avLst/>
+          </a:prstGeom>
+          <a:ln>
+            <a:tailEnd type="triangle"/>
+          </a:ln>
+        </p:spPr>
+        <p:style>
+          <a:lnRef idx="1">
+            <a:schemeClr val="accent1"/>
+          </a:lnRef>
+          <a:fillRef idx="0">
+            <a:schemeClr val="accent1"/>
+          </a:fillRef>
+          <a:effectRef idx="0">
+            <a:schemeClr val="accent1"/>
+          </a:effectRef>
+          <a:fontRef idx="minor">
+            <a:schemeClr val="tx1"/>
+          </a:fontRef>
+        </p:style>
+      </p:cxnSp>
+      <p:sp>
+        <p:nvSpPr>
+          <p:cNvPr id="14" name="文字方塊 13">
+            <a:extLst>
+              <a:ext uri="{FF2B5EF4-FFF2-40B4-BE49-F238E27FC236}">
+                <a16:creationId xmlns:a16="http://schemas.microsoft.com/office/drawing/2014/main" id="{B2E79091-B153-453B-81F7-F591BEEC765D}"/>
+              </a:ext>
+            </a:extLst>
+          </p:cNvPr>
+          <p:cNvSpPr txBox="1"/>
+          <p:nvPr/>
+        </p:nvSpPr>
+        <p:spPr>
+          <a:xfrm>
+            <a:off x="6662057" y="2644819"/>
+            <a:ext cx="2351314" cy="307777"/>
+          </a:xfrm>
+          <a:prstGeom prst="rect">
+            <a:avLst/>
+          </a:prstGeom>
+          <a:noFill/>
+        </p:spPr>
+        <p:txBody>
+          <a:bodyPr wrap="square">
+            <a:spAutoFit/>
+          </a:bodyPr>
+          <a:lstStyle/>
+          <a:p>
+            <a:r>
+              <a:rPr lang="en-US" altLang="zh-TW" dirty="0"/>
+              <a:t>HTC+CBNetV2+2*Swim-L</a:t>
+            </a:r>
+            <a:endParaRPr lang="zh-TW" altLang="en-US" dirty="0"/>
+          </a:p>
+        </p:txBody>
+      </p:sp>
+    </p:spTree>
+    <p:extLst>
+      <p:ext uri="{BB962C8B-B14F-4D97-AF65-F5344CB8AC3E}">
+        <p14:creationId xmlns:p14="http://schemas.microsoft.com/office/powerpoint/2010/main" val="3986628821"/>
+      </p:ext>
+    </p:extLst>
+  </p:cSld>
+  <p:clrMapOvr>
+    <a:masterClrMapping/>
+  </p:clrMapOvr>
+  <p:transition spd="slow">
+    <p:push/>
+  </p:transition>
+</p:sld>
+</file>
+
+<file path=ppt/slides/slide27.xml><?xml version="1.0" encoding="utf-8"?>
+<p:sld xmlns:a="http://schemas.openxmlformats.org/drawingml/2006/main" xmlns:r="http://schemas.openxmlformats.org/officeDocument/2006/relationships" xmlns:p="http://schemas.openxmlformats.org/presentationml/2006/main">
+  <p:cSld>
+    <p:spTree>
+      <p:nvGrpSpPr>
+        <p:cNvPr id="1" name="Shape 175"/>
+        <p:cNvGrpSpPr/>
+        <p:nvPr/>
+      </p:nvGrpSpPr>
+      <p:grpSpPr>
+        <a:xfrm>
+          <a:off x="0" y="0"/>
+          <a:ext cx="0" cy="0"/>
+          <a:chOff x="0" y="0"/>
+          <a:chExt cx="0" cy="0"/>
+        </a:xfrm>
+      </p:grpSpPr>
+      <p:sp>
+        <p:nvSpPr>
+          <p:cNvPr id="176" name="Google Shape;176;p29"/>
+          <p:cNvSpPr/>
+          <p:nvPr/>
+        </p:nvSpPr>
+        <p:spPr>
+          <a:xfrm>
+            <a:off x="0" y="1681046"/>
+            <a:ext cx="9144000" cy="1781400"/>
+          </a:xfrm>
+          <a:prstGeom prst="rect">
+            <a:avLst/>
+          </a:prstGeom>
+          <a:solidFill>
+            <a:srgbClr val="08244A"/>
+          </a:solidFill>
+          <a:ln>
+            <a:noFill/>
+          </a:ln>
+        </p:spPr>
+        <p:txBody>
+          <a:bodyPr spcFirstLastPara="1" wrap="square" lIns="68575" tIns="34275" rIns="68575" bIns="34275" anchor="ctr" anchorCtr="0">
+            <a:noAutofit/>
+          </a:bodyPr>
+          <a:lstStyle/>
+          <a:p>
+            <a:pPr marL="0" marR="0" lvl="0" indent="0" algn="ctr" rtl="0">
+              <a:spcBef>
+                <a:spcPts val="0"/>
+              </a:spcBef>
+              <a:spcAft>
+                <a:spcPts val="0"/>
+              </a:spcAft>
+              <a:buNone/>
+            </a:pPr>
+            <a:endParaRPr sz="1400" b="0" i="0" u="none" strike="noStrike" cap="none">
+              <a:solidFill>
+                <a:schemeClr val="lt1"/>
+              </a:solidFill>
+              <a:latin typeface="Arial"/>
+              <a:ea typeface="Arial"/>
+              <a:cs typeface="Arial"/>
+              <a:sym typeface="Arial"/>
+            </a:endParaRPr>
+          </a:p>
+        </p:txBody>
+      </p:sp>
+      <p:sp>
+        <p:nvSpPr>
+          <p:cNvPr id="177" name="Google Shape;177;p29"/>
+          <p:cNvSpPr txBox="1"/>
+          <p:nvPr/>
+        </p:nvSpPr>
+        <p:spPr>
+          <a:xfrm>
+            <a:off x="2154300" y="2148446"/>
+            <a:ext cx="4835400" cy="423300"/>
+          </a:xfrm>
+          <a:prstGeom prst="rect">
+            <a:avLst/>
+          </a:prstGeom>
+          <a:noFill/>
+          <a:ln>
+            <a:noFill/>
+          </a:ln>
+        </p:spPr>
+        <p:txBody>
+          <a:bodyPr spcFirstLastPara="1" wrap="square" lIns="68575" tIns="34275" rIns="68575" bIns="34275" anchor="t" anchorCtr="0">
+            <a:spAutoFit/>
+          </a:bodyPr>
+          <a:lstStyle/>
+          <a:p>
+            <a:pPr marL="0" marR="0" lvl="0" indent="0" algn="ctr" rtl="0">
+              <a:spcBef>
+                <a:spcPts val="0"/>
+              </a:spcBef>
+              <a:spcAft>
+                <a:spcPts val="0"/>
+              </a:spcAft>
+              <a:buNone/>
+            </a:pPr>
+            <a:r>
+              <a:rPr lang="en-US" altLang="zh-TW" sz="2300" b="1" dirty="0">
+                <a:solidFill>
+                  <a:schemeClr val="lt1"/>
+                </a:solidFill>
+                <a:latin typeface="Microsoft JhengHei"/>
+                <a:ea typeface="Microsoft JhengHei"/>
+                <a:cs typeface="Microsoft JhengHei"/>
+                <a:sym typeface="Microsoft JhengHei"/>
+              </a:rPr>
+              <a:t>Conclusion </a:t>
+            </a:r>
+            <a:endParaRPr sz="1700" b="1" dirty="0">
+              <a:solidFill>
+                <a:schemeClr val="lt1"/>
+              </a:solidFill>
+              <a:latin typeface="Microsoft JhengHei"/>
+              <a:ea typeface="Microsoft JhengHei"/>
+              <a:cs typeface="Microsoft JhengHei"/>
+              <a:sym typeface="Microsoft JhengHei"/>
+            </a:endParaRPr>
+          </a:p>
+        </p:txBody>
+      </p:sp>
+      <p:cxnSp>
+        <p:nvCxnSpPr>
+          <p:cNvPr id="178" name="Google Shape;178;p29"/>
+          <p:cNvCxnSpPr/>
+          <p:nvPr/>
+        </p:nvCxnSpPr>
+        <p:spPr>
+          <a:xfrm>
+            <a:off x="0" y="2326072"/>
+            <a:ext cx="1225800" cy="0"/>
+          </a:xfrm>
+          <a:prstGeom prst="straightConnector1">
+            <a:avLst/>
+          </a:prstGeom>
+          <a:noFill/>
+          <a:ln w="12700" cap="flat" cmpd="sng">
+            <a:solidFill>
+              <a:schemeClr val="lt1"/>
+            </a:solidFill>
+            <a:prstDash val="solid"/>
+            <a:miter lim="800000"/>
+            <a:headEnd type="none" w="sm" len="sm"/>
+            <a:tailEnd type="none" w="sm" len="sm"/>
+          </a:ln>
+        </p:spPr>
+      </p:cxnSp>
+      <p:cxnSp>
+        <p:nvCxnSpPr>
+          <p:cNvPr id="179" name="Google Shape;179;p29"/>
+          <p:cNvCxnSpPr/>
+          <p:nvPr/>
+        </p:nvCxnSpPr>
+        <p:spPr>
+          <a:xfrm>
+            <a:off x="7918133" y="2326072"/>
+            <a:ext cx="1225800" cy="0"/>
+          </a:xfrm>
+          <a:prstGeom prst="straightConnector1">
+            <a:avLst/>
+          </a:prstGeom>
+          <a:noFill/>
+          <a:ln w="12700" cap="flat" cmpd="sng">
+            <a:solidFill>
+              <a:schemeClr val="lt1"/>
+            </a:solidFill>
+            <a:prstDash val="solid"/>
+            <a:miter lim="800000"/>
+            <a:headEnd type="none" w="sm" len="sm"/>
+            <a:tailEnd type="none" w="sm" len="sm"/>
+          </a:ln>
+        </p:spPr>
+      </p:cxnSp>
+      <p:sp>
+        <p:nvSpPr>
+          <p:cNvPr id="180" name="Google Shape;180;p29"/>
+          <p:cNvSpPr txBox="1"/>
+          <p:nvPr/>
+        </p:nvSpPr>
+        <p:spPr>
+          <a:xfrm>
+            <a:off x="7422919" y="4868275"/>
+            <a:ext cx="1660500" cy="238500"/>
+          </a:xfrm>
+          <a:prstGeom prst="rect">
+            <a:avLst/>
+          </a:prstGeom>
+          <a:noFill/>
+          <a:ln>
+            <a:noFill/>
+          </a:ln>
+        </p:spPr>
+        <p:txBody>
+          <a:bodyPr spcFirstLastPara="1" wrap="square" lIns="68575" tIns="34275" rIns="68575" bIns="34275" anchor="t" anchorCtr="0">
+            <a:spAutoFit/>
+          </a:bodyPr>
+          <a:lstStyle/>
+          <a:p>
+            <a:pPr marL="0" marR="0" lvl="0" indent="0" algn="r" rtl="0">
+              <a:spcBef>
+                <a:spcPts val="0"/>
+              </a:spcBef>
+              <a:spcAft>
+                <a:spcPts val="0"/>
+              </a:spcAft>
+              <a:buNone/>
+            </a:pPr>
+            <a:r>
+              <a:rPr lang="zh-TW" sz="1100">
+                <a:solidFill>
+                  <a:srgbClr val="A5A5A5"/>
+                </a:solidFill>
+                <a:latin typeface="Consolas"/>
+                <a:ea typeface="Consolas"/>
+                <a:cs typeface="Consolas"/>
+                <a:sym typeface="Consolas"/>
+              </a:rPr>
+              <a:t>NTUST GAMELab</a:t>
+            </a:r>
+            <a:endParaRPr sz="1100">
+              <a:solidFill>
+                <a:srgbClr val="A5A5A5"/>
+              </a:solidFill>
+              <a:latin typeface="Consolas"/>
+              <a:ea typeface="Consolas"/>
+              <a:cs typeface="Consolas"/>
+              <a:sym typeface="Consolas"/>
+            </a:endParaRPr>
+          </a:p>
+        </p:txBody>
+      </p:sp>
+    </p:spTree>
+    <p:extLst>
+      <p:ext uri="{BB962C8B-B14F-4D97-AF65-F5344CB8AC3E}">
+        <p14:creationId xmlns:p14="http://schemas.microsoft.com/office/powerpoint/2010/main" val="249828917"/>
+      </p:ext>
+    </p:extLst>
+  </p:cSld>
+  <p:clrMapOvr>
+    <a:masterClrMapping/>
+  </p:clrMapOvr>
+</p:sld>
+</file>
+
+<file path=ppt/slides/slide28.xml><?xml version="1.0" encoding="utf-8"?>
+<p:sld xmlns:a="http://schemas.openxmlformats.org/drawingml/2006/main" xmlns:r="http://schemas.openxmlformats.org/officeDocument/2006/relationships" xmlns:p="http://schemas.openxmlformats.org/presentationml/2006/main">
+  <p:cSld>
+    <p:spTree>
+      <p:nvGrpSpPr>
+        <p:cNvPr id="1" name="Shape 163"/>
+        <p:cNvGrpSpPr/>
+        <p:nvPr/>
+      </p:nvGrpSpPr>
+      <p:grpSpPr>
+        <a:xfrm>
+          <a:off x="0" y="0"/>
+          <a:ext cx="0" cy="0"/>
+          <a:chOff x="0" y="0"/>
+          <a:chExt cx="0" cy="0"/>
+        </a:xfrm>
+      </p:grpSpPr>
+      <p:cxnSp>
+        <p:nvCxnSpPr>
+          <p:cNvPr id="164" name="Google Shape;164;p28"/>
+          <p:cNvCxnSpPr/>
+          <p:nvPr/>
+        </p:nvCxnSpPr>
+        <p:spPr>
+          <a:xfrm rot="10800000">
+            <a:off x="471906" y="672952"/>
+            <a:ext cx="8200200" cy="0"/>
+          </a:xfrm>
+          <a:prstGeom prst="straightConnector1">
+            <a:avLst/>
+          </a:prstGeom>
+          <a:noFill/>
+          <a:ln w="38100" cap="flat" cmpd="sng">
+            <a:solidFill>
+              <a:srgbClr val="08244A"/>
+            </a:solidFill>
+            <a:prstDash val="solid"/>
+            <a:miter lim="800000"/>
+            <a:headEnd type="none" w="sm" len="sm"/>
+            <a:tailEnd type="none" w="sm" len="sm"/>
+          </a:ln>
+        </p:spPr>
+      </p:cxnSp>
+      <p:sp>
+        <p:nvSpPr>
+          <p:cNvPr id="165" name="Google Shape;165;p28"/>
+          <p:cNvSpPr txBox="1"/>
+          <p:nvPr/>
+        </p:nvSpPr>
+        <p:spPr>
+          <a:xfrm>
+            <a:off x="4312990" y="4919588"/>
+            <a:ext cx="518100" cy="238500"/>
+          </a:xfrm>
+          <a:prstGeom prst="rect">
+            <a:avLst/>
+          </a:prstGeom>
+          <a:solidFill>
+            <a:srgbClr val="08244A"/>
+          </a:solidFill>
+          <a:ln>
+            <a:noFill/>
+          </a:ln>
+        </p:spPr>
+        <p:txBody>
+          <a:bodyPr spcFirstLastPara="1" wrap="square" lIns="68575" tIns="34275" rIns="68575" bIns="34275" anchor="t" anchorCtr="0">
+            <a:spAutoFit/>
+          </a:bodyPr>
+          <a:lstStyle/>
+          <a:p>
+            <a:pPr marL="0" marR="0" lvl="0" indent="0" algn="ctr" rtl="0">
+              <a:spcBef>
+                <a:spcPts val="0"/>
+              </a:spcBef>
+              <a:spcAft>
+                <a:spcPts val="0"/>
+              </a:spcAft>
+              <a:buNone/>
+            </a:pPr>
+            <a:endParaRPr sz="1100">
+              <a:solidFill>
+                <a:schemeClr val="lt1"/>
+              </a:solidFill>
+              <a:latin typeface="Arial"/>
+              <a:ea typeface="Arial"/>
+              <a:cs typeface="Arial"/>
+              <a:sym typeface="Arial"/>
+            </a:endParaRPr>
+          </a:p>
+        </p:txBody>
+      </p:sp>
+      <p:sp>
+        <p:nvSpPr>
+          <p:cNvPr id="166" name="Google Shape;166;p28"/>
+          <p:cNvSpPr txBox="1"/>
+          <p:nvPr/>
+        </p:nvSpPr>
+        <p:spPr>
+          <a:xfrm>
+            <a:off x="7422919" y="4868275"/>
+            <a:ext cx="1660500" cy="238500"/>
+          </a:xfrm>
+          <a:prstGeom prst="rect">
+            <a:avLst/>
+          </a:prstGeom>
+          <a:noFill/>
+          <a:ln>
+            <a:noFill/>
+          </a:ln>
+        </p:spPr>
+        <p:txBody>
+          <a:bodyPr spcFirstLastPara="1" wrap="square" lIns="68575" tIns="34275" rIns="68575" bIns="34275" anchor="t" anchorCtr="0">
+            <a:spAutoFit/>
+          </a:bodyPr>
+          <a:lstStyle/>
+          <a:p>
+            <a:pPr marL="0" marR="0" lvl="0" indent="0" algn="r" rtl="0">
+              <a:spcBef>
+                <a:spcPts val="0"/>
+              </a:spcBef>
+              <a:spcAft>
+                <a:spcPts val="0"/>
+              </a:spcAft>
+              <a:buNone/>
+            </a:pPr>
+            <a:r>
+              <a:rPr lang="zh-TW" sz="1100">
+                <a:solidFill>
+                  <a:srgbClr val="A5A5A5"/>
+                </a:solidFill>
+                <a:latin typeface="Consolas"/>
+                <a:ea typeface="Consolas"/>
+                <a:cs typeface="Consolas"/>
+                <a:sym typeface="Consolas"/>
+              </a:rPr>
+              <a:t>NTUST GAMELab</a:t>
+            </a:r>
+            <a:endParaRPr sz="1100">
+              <a:solidFill>
+                <a:srgbClr val="A5A5A5"/>
+              </a:solidFill>
+              <a:latin typeface="Consolas"/>
+              <a:ea typeface="Consolas"/>
+              <a:cs typeface="Consolas"/>
+              <a:sym typeface="Consolas"/>
+            </a:endParaRPr>
+          </a:p>
+        </p:txBody>
+      </p:sp>
+      <p:sp>
+        <p:nvSpPr>
+          <p:cNvPr id="167" name="Google Shape;167;p28"/>
+          <p:cNvSpPr txBox="1">
+            <a:spLocks noGrp="1"/>
+          </p:cNvSpPr>
+          <p:nvPr>
+            <p:ph type="sldNum" idx="12"/>
+          </p:nvPr>
+        </p:nvSpPr>
+        <p:spPr>
+          <a:xfrm>
+            <a:off x="3543300" y="4904660"/>
+            <a:ext cx="2057400" cy="273900"/>
+          </a:xfrm>
+          <a:prstGeom prst="rect">
+            <a:avLst/>
+          </a:prstGeom>
+          <a:noFill/>
+          <a:ln>
+            <a:noFill/>
+          </a:ln>
+        </p:spPr>
+        <p:txBody>
+          <a:bodyPr spcFirstLastPara="1" wrap="square" lIns="68575" tIns="34275" rIns="68575" bIns="34275" anchor="ctr" anchorCtr="0">
+            <a:noAutofit/>
+          </a:bodyPr>
+          <a:lstStyle/>
+          <a:p>
+            <a:pPr marL="0" lvl="0" indent="0" algn="ctr" rtl="0">
+              <a:spcBef>
+                <a:spcPts val="0"/>
+              </a:spcBef>
+              <a:spcAft>
+                <a:spcPts val="0"/>
+              </a:spcAft>
+              <a:buNone/>
+            </a:pPr>
+            <a:fld id="{00000000-1234-1234-1234-123412341234}" type="slidenum">
+              <a:rPr lang="en-US" altLang="zh-TW" sz="1100"/>
+              <a:t>28</a:t>
+            </a:fld>
+            <a:endParaRPr sz="1100"/>
+          </a:p>
+        </p:txBody>
+      </p:sp>
+      <p:sp>
+        <p:nvSpPr>
+          <p:cNvPr id="168" name="Google Shape;168;p28"/>
+          <p:cNvSpPr txBox="1"/>
+          <p:nvPr/>
+        </p:nvSpPr>
+        <p:spPr>
+          <a:xfrm>
+            <a:off x="575084" y="273102"/>
+            <a:ext cx="8539843" cy="392385"/>
+          </a:xfrm>
+          <a:prstGeom prst="rect">
+            <a:avLst/>
+          </a:prstGeom>
+          <a:noFill/>
+          <a:ln>
+            <a:noFill/>
+          </a:ln>
+        </p:spPr>
+        <p:txBody>
+          <a:bodyPr spcFirstLastPara="1" wrap="square" lIns="68575" tIns="34275" rIns="68575" bIns="34275" anchor="t" anchorCtr="0">
+            <a:spAutoFit/>
+          </a:bodyPr>
+          <a:lstStyle/>
+          <a:p>
+            <a:pPr marL="0" marR="0" lvl="0" indent="0" algn="l" rtl="0">
+              <a:spcBef>
+                <a:spcPts val="0"/>
+              </a:spcBef>
+              <a:spcAft>
+                <a:spcPts val="0"/>
+              </a:spcAft>
+              <a:buNone/>
+            </a:pPr>
+            <a:r>
+              <a:rPr lang="en-US" sz="2100" b="1" dirty="0">
+                <a:solidFill>
+                  <a:srgbClr val="08244A"/>
+                </a:solidFill>
+                <a:latin typeface="Microsoft JhengHei"/>
+                <a:ea typeface="Microsoft JhengHei"/>
+                <a:cs typeface="Microsoft JhengHei"/>
+                <a:sym typeface="Microsoft JhengHei"/>
+              </a:rPr>
+              <a:t>Experiments - Comparisons with Hierarchical Backbones</a:t>
+            </a:r>
+          </a:p>
+        </p:txBody>
+      </p:sp>
       <p:sp>
         <p:nvSpPr>
           <p:cNvPr id="12" name="文字方塊 11">
@@ -30187,7 +31381,7 @@
                 <a:effectLst/>
                 <a:latin typeface="Arial" panose="020B0604020202020204" pitchFamily="34" charset="0"/>
               </a:rPr>
-              <a:t>adopt soft-</a:t>
+              <a:t>Adopt soft-</a:t>
             </a:r>
             <a:r>
               <a:rPr lang="en-US" altLang="zh-TW" b="0" i="0" dirty="0" err="1">
@@ -30233,7 +31427,7 @@
     </p:spTree>
     <p:extLst>
       <p:ext uri="{BB962C8B-B14F-4D97-AF65-F5344CB8AC3E}">
-        <p14:creationId xmlns:p14="http://schemas.microsoft.com/office/powerpoint/2010/main" val="3986628821"/>
+        <p14:creationId xmlns:p14="http://schemas.microsoft.com/office/powerpoint/2010/main" val="2223204641"/>
       </p:ext>
     </p:extLst>
   </p:cSld>
@@ -30246,7 +31440,7 @@
 </p:sld>
 </file>
 
-<file path=ppt/slides/slide27.xml><?xml version="1.0" encoding="utf-8"?>
+<file path=ppt/slides/slide29.xml><?xml version="1.0" encoding="utf-8"?>
 <p:sld xmlns:a="http://schemas.openxmlformats.org/drawingml/2006/main" xmlns:r="http://schemas.openxmlformats.org/officeDocument/2006/relationships" xmlns:p="http://schemas.openxmlformats.org/presentationml/2006/main">
   <p:cSld>
     <p:spTree>
@@ -30451,7 +31645,7 @@
             </a:pPr>
             <a:fld id="{00000000-1234-1234-1234-123412341234}" type="slidenum">
               <a:rPr lang="en-US" altLang="zh-TW"/>
-              <a:t>27</a:t>
+              <a:t>29</a:t>
             </a:fld>
             <a:endParaRPr/>
           </a:p>

</xml_diff>